<commit_message>
updates to module 7 slide deck
</commit_message>
<xml_diff>
--- a/Slides/M4 Server.pptx
+++ b/Slides/M4 Server.pptx
@@ -6,10 +6,10 @@
     <p:sldMasterId id="2147483674" r:id="rId5"/>
   </p:sldMasterIdLst>
   <p:notesMasterIdLst>
-    <p:notesMasterId r:id="rId16"/>
+    <p:notesMasterId r:id="rId18"/>
   </p:notesMasterIdLst>
   <p:handoutMasterIdLst>
-    <p:handoutMasterId r:id="rId17"/>
+    <p:handoutMasterId r:id="rId19"/>
   </p:handoutMasterIdLst>
   <p:sldIdLst>
     <p:sldId id="459" r:id="rId6"/>
@@ -17,11 +17,13 @@
     <p:sldId id="283" r:id="rId8"/>
     <p:sldId id="288" r:id="rId9"/>
     <p:sldId id="414" r:id="rId10"/>
-    <p:sldId id="447" r:id="rId11"/>
-    <p:sldId id="416" r:id="rId12"/>
-    <p:sldId id="454" r:id="rId13"/>
-    <p:sldId id="458" r:id="rId14"/>
-    <p:sldId id="269" r:id="rId15"/>
+    <p:sldId id="461" r:id="rId11"/>
+    <p:sldId id="462" r:id="rId12"/>
+    <p:sldId id="447" r:id="rId13"/>
+    <p:sldId id="463" r:id="rId14"/>
+    <p:sldId id="454" r:id="rId15"/>
+    <p:sldId id="464" r:id="rId16"/>
+    <p:sldId id="269" r:id="rId17"/>
   </p:sldIdLst>
   <p:sldSz cx="12192000" cy="6858000"/>
   <p:notesSz cx="6858000" cy="9144000"/>
@@ -134,10 +136,12 @@
             <p14:sldId id="283"/>
             <p14:sldId id="288"/>
             <p14:sldId id="414"/>
+            <p14:sldId id="461"/>
+            <p14:sldId id="462"/>
             <p14:sldId id="447"/>
-            <p14:sldId id="416"/>
+            <p14:sldId id="463"/>
             <p14:sldId id="454"/>
-            <p14:sldId id="458"/>
+            <p14:sldId id="464"/>
           </p14:sldIdLst>
         </p14:section>
         <p14:section name="End" id="{E17367C9-8ACE-479F-BE70-706EA28440B9}">
@@ -1074,17 +1078,30 @@
         </p:nvSpPr>
         <p:spPr/>
         <p:txBody>
-          <a:bodyPr>
-            <a:noAutofit/>
-          </a:bodyPr>
+          <a:bodyPr/>
           <a:lstStyle/>
           <a:p>
-            <a:endParaRPr lang="en-GB" dirty="0">
-              <a:solidFill>
-                <a:schemeClr val="tx2"/>
-              </a:solidFill>
-              <a:latin typeface="Segoe" pitchFamily="34" charset="0"/>
-            </a:endParaRPr>
+            <a:r>
+              <a:rPr lang="en-US" dirty="0" smtClean="0"/>
+              <a:t>we're going to do a lot here – create the mobile service, create a knots table, create a steps table,</a:t>
+            </a:r>
+            <a:r>
+              <a:rPr lang="en-US" baseline="0" dirty="0" smtClean="0"/>
+              <a:t> add sample data, create a knots </a:t>
+            </a:r>
+            <a:r>
+              <a:rPr lang="en-US" baseline="0" dirty="0" err="1" smtClean="0"/>
+              <a:t>api</a:t>
+            </a:r>
+            <a:r>
+              <a:rPr lang="en-US" baseline="0" dirty="0" smtClean="0"/>
+              <a:t>, show the PowerShell functions for simple get </a:t>
+            </a:r>
+            <a:r>
+              <a:rPr lang="en-US" baseline="0" smtClean="0"/>
+              <a:t>and post</a:t>
+            </a:r>
+            <a:endParaRPr lang="en-US"/>
           </a:p>
         </p:txBody>
       </p:sp>
@@ -1103,19 +1120,18 @@
           <a:bodyPr/>
           <a:lstStyle/>
           <a:p>
-            <a:fld id="{13F0F35F-DD44-4607-AEC1-49D7A4BC4066}" type="slidenum">
+            <a:fld id="{4CFD207A-07DF-40AD-A916-9872E089CE7A}" type="slidenum">
               <a:rPr lang="en-US" smtClean="0"/>
-              <a:pPr/>
-              <a:t>8</a:t>
+              <a:t>9</a:t>
             </a:fld>
-            <a:endParaRPr lang="en-US" dirty="0"/>
+            <a:endParaRPr lang="en-US"/>
           </a:p>
         </p:txBody>
       </p:sp>
     </p:spTree>
     <p:extLst>
       <p:ext uri="{BB962C8B-B14F-4D97-AF65-F5344CB8AC3E}">
-        <p14:creationId xmlns:p14="http://schemas.microsoft.com/office/powerpoint/2010/main" val="3625277357"/>
+        <p14:creationId xmlns:p14="http://schemas.microsoft.com/office/powerpoint/2010/main" val="1836319357"/>
       </p:ext>
     </p:extLst>
   </p:cSld>
@@ -1198,7 +1214,7 @@
             <a:fld id="{13F0F35F-DD44-4607-AEC1-49D7A4BC4066}" type="slidenum">
               <a:rPr lang="en-US" smtClean="0"/>
               <a:pPr/>
-              <a:t>9</a:t>
+              <a:t>10</a:t>
             </a:fld>
             <a:endParaRPr lang="en-US" dirty="0"/>
           </a:p>
@@ -1207,7 +1223,99 @@
     </p:spTree>
     <p:extLst>
       <p:ext uri="{BB962C8B-B14F-4D97-AF65-F5344CB8AC3E}">
-        <p14:creationId xmlns:p14="http://schemas.microsoft.com/office/powerpoint/2010/main" val="2458564682"/>
+        <p14:creationId xmlns:p14="http://schemas.microsoft.com/office/powerpoint/2010/main" val="3625277357"/>
+      </p:ext>
+    </p:extLst>
+  </p:cSld>
+  <p:clrMapOvr>
+    <a:masterClrMapping/>
+  </p:clrMapOvr>
+</p:notes>
+</file>
+
+<file path=ppt/notesSlides/notesSlide7.xml><?xml version="1.0" encoding="utf-8"?>
+<p:notes xmlns:a="http://schemas.openxmlformats.org/drawingml/2006/main" xmlns:r="http://schemas.openxmlformats.org/officeDocument/2006/relationships" xmlns:p="http://schemas.openxmlformats.org/presentationml/2006/main">
+  <p:cSld>
+    <p:spTree>
+      <p:nvGrpSpPr>
+        <p:cNvPr id="1" name=""/>
+        <p:cNvGrpSpPr/>
+        <p:nvPr/>
+      </p:nvGrpSpPr>
+      <p:grpSpPr>
+        <a:xfrm>
+          <a:off x="0" y="0"/>
+          <a:ext cx="0" cy="0"/>
+          <a:chOff x="0" y="0"/>
+          <a:chExt cx="0" cy="0"/>
+        </a:xfrm>
+      </p:grpSpPr>
+      <p:sp>
+        <p:nvSpPr>
+          <p:cNvPr id="2" name="Slide Image Placeholder 1"/>
+          <p:cNvSpPr>
+            <a:spLocks noGrp="1" noRot="1" noChangeAspect="1"/>
+          </p:cNvSpPr>
+          <p:nvPr>
+            <p:ph type="sldImg"/>
+          </p:nvPr>
+        </p:nvSpPr>
+        <p:spPr/>
+      </p:sp>
+      <p:sp>
+        <p:nvSpPr>
+          <p:cNvPr id="3" name="Notes Placeholder 2"/>
+          <p:cNvSpPr>
+            <a:spLocks noGrp="1"/>
+          </p:cNvSpPr>
+          <p:nvPr>
+            <p:ph type="body" idx="1"/>
+          </p:nvPr>
+        </p:nvSpPr>
+        <p:spPr/>
+        <p:txBody>
+          <a:bodyPr>
+            <a:noAutofit/>
+          </a:bodyPr>
+          <a:lstStyle/>
+          <a:p>
+            <a:endParaRPr lang="en-GB" dirty="0">
+              <a:solidFill>
+                <a:schemeClr val="tx2"/>
+              </a:solidFill>
+              <a:latin typeface="Segoe" pitchFamily="34" charset="0"/>
+            </a:endParaRPr>
+          </a:p>
+        </p:txBody>
+      </p:sp>
+      <p:sp>
+        <p:nvSpPr>
+          <p:cNvPr id="4" name="Slide Number Placeholder 3"/>
+          <p:cNvSpPr>
+            <a:spLocks noGrp="1"/>
+          </p:cNvSpPr>
+          <p:nvPr>
+            <p:ph type="sldNum" sz="quarter" idx="10"/>
+          </p:nvPr>
+        </p:nvSpPr>
+        <p:spPr/>
+        <p:txBody>
+          <a:bodyPr/>
+          <a:lstStyle/>
+          <a:p>
+            <a:fld id="{13F0F35F-DD44-4607-AEC1-49D7A4BC4066}" type="slidenum">
+              <a:rPr lang="en-US" smtClean="0"/>
+              <a:pPr/>
+              <a:t>11</a:t>
+            </a:fld>
+            <a:endParaRPr lang="en-US" dirty="0"/>
+          </a:p>
+        </p:txBody>
+      </p:sp>
+    </p:spTree>
+    <p:extLst>
+      <p:ext uri="{BB962C8B-B14F-4D97-AF65-F5344CB8AC3E}">
+        <p14:creationId xmlns:p14="http://schemas.microsoft.com/office/powerpoint/2010/main" val="3425944654"/>
       </p:ext>
     </p:extLst>
   </p:cSld>
@@ -6739,6 +6847,194 @@
           <a:chExt cx="0" cy="0"/>
         </a:xfrm>
       </p:grpSpPr>
+      <p:sp>
+        <p:nvSpPr>
+          <p:cNvPr id="7" name="Content Placeholder 6"/>
+          <p:cNvSpPr>
+            <a:spLocks noGrp="1"/>
+          </p:cNvSpPr>
+          <p:nvPr>
+            <p:ph sz="quarter" idx="10"/>
+          </p:nvPr>
+        </p:nvSpPr>
+        <p:spPr/>
+        <p:txBody>
+          <a:bodyPr>
+            <a:normAutofit/>
+          </a:bodyPr>
+          <a:lstStyle/>
+          <a:p>
+            <a:r>
+              <a:rPr lang="en-GB" dirty="0" smtClean="0">
+                <a:solidFill>
+                  <a:srgbClr val="FF0000"/>
+                </a:solidFill>
+              </a:rPr>
+              <a:t>{azure mobile services docs}</a:t>
+            </a:r>
+            <a:endParaRPr lang="en-GB" dirty="0">
+              <a:solidFill>
+                <a:srgbClr val="FF0000"/>
+              </a:solidFill>
+            </a:endParaRPr>
+          </a:p>
+        </p:txBody>
+      </p:sp>
+      <p:sp>
+        <p:nvSpPr>
+          <p:cNvPr id="2" name="Title 1"/>
+          <p:cNvSpPr>
+            <a:spLocks noGrp="1"/>
+          </p:cNvSpPr>
+          <p:nvPr>
+            <p:ph type="title"/>
+          </p:nvPr>
+        </p:nvSpPr>
+        <p:spPr/>
+        <p:txBody>
+          <a:bodyPr/>
+          <a:lstStyle/>
+          <a:p>
+            <a:r>
+              <a:rPr lang="en-US" dirty="0" smtClean="0"/>
+              <a:t>Resources</a:t>
+            </a:r>
+            <a:endParaRPr lang="en-US" dirty="0"/>
+          </a:p>
+        </p:txBody>
+      </p:sp>
+    </p:spTree>
+    <p:extLst>
+      <p:ext uri="{BB962C8B-B14F-4D97-AF65-F5344CB8AC3E}">
+        <p14:creationId xmlns:p14="http://schemas.microsoft.com/office/powerpoint/2010/main" val="2567384094"/>
+      </p:ext>
+    </p:extLst>
+  </p:cSld>
+  <p:clrMapOvr>
+    <a:masterClrMapping/>
+  </p:clrMapOvr>
+  <p:timing>
+    <p:tnLst>
+      <p:par>
+        <p:cTn id="1" dur="indefinite" restart="never" nodeType="tmRoot"/>
+      </p:par>
+    </p:tnLst>
+  </p:timing>
+</p:sld>
+</file>
+
+<file path=ppt/slides/slide11.xml><?xml version="1.0" encoding="utf-8"?>
+<p:sld xmlns:a="http://schemas.openxmlformats.org/drawingml/2006/main" xmlns:r="http://schemas.openxmlformats.org/officeDocument/2006/relationships" xmlns:p="http://schemas.openxmlformats.org/presentationml/2006/main">
+  <p:cSld>
+    <p:spTree>
+      <p:nvGrpSpPr>
+        <p:cNvPr id="1" name=""/>
+        <p:cNvGrpSpPr/>
+        <p:nvPr/>
+      </p:nvGrpSpPr>
+      <p:grpSpPr>
+        <a:xfrm>
+          <a:off x="0" y="0"/>
+          <a:ext cx="0" cy="0"/>
+          <a:chOff x="0" y="0"/>
+          <a:chExt cx="0" cy="0"/>
+        </a:xfrm>
+      </p:grpSpPr>
+      <p:sp>
+        <p:nvSpPr>
+          <p:cNvPr id="7" name="Content Placeholder 6"/>
+          <p:cNvSpPr>
+            <a:spLocks noGrp="1"/>
+          </p:cNvSpPr>
+          <p:nvPr>
+            <p:ph sz="quarter" idx="10"/>
+          </p:nvPr>
+        </p:nvSpPr>
+        <p:spPr/>
+        <p:txBody>
+          <a:bodyPr>
+            <a:normAutofit/>
+          </a:bodyPr>
+          <a:lstStyle/>
+          <a:p>
+            <a:r>
+              <a:rPr lang="en-GB" dirty="0" smtClean="0"/>
+              <a:t>Server architecture</a:t>
+            </a:r>
+            <a:endParaRPr lang="en-GB" dirty="0"/>
+          </a:p>
+          <a:p>
+            <a:r>
+              <a:rPr lang="en-GB" dirty="0" smtClean="0"/>
+              <a:t>Creating the Mobile Service</a:t>
+            </a:r>
+            <a:endParaRPr lang="en-GB" dirty="0"/>
+          </a:p>
+          <a:p>
+            <a:endParaRPr lang="en-GB" dirty="0"/>
+          </a:p>
+        </p:txBody>
+      </p:sp>
+      <p:sp>
+        <p:nvSpPr>
+          <p:cNvPr id="2" name="Title 1"/>
+          <p:cNvSpPr>
+            <a:spLocks noGrp="1"/>
+          </p:cNvSpPr>
+          <p:nvPr>
+            <p:ph type="title"/>
+          </p:nvPr>
+        </p:nvSpPr>
+        <p:spPr/>
+        <p:txBody>
+          <a:bodyPr/>
+          <a:lstStyle/>
+          <a:p>
+            <a:r>
+              <a:rPr lang="en-US" dirty="0" smtClean="0"/>
+              <a:t>Summary</a:t>
+            </a:r>
+            <a:endParaRPr lang="en-US" dirty="0"/>
+          </a:p>
+        </p:txBody>
+      </p:sp>
+    </p:spTree>
+    <p:extLst>
+      <p:ext uri="{BB962C8B-B14F-4D97-AF65-F5344CB8AC3E}">
+        <p14:creationId xmlns:p14="http://schemas.microsoft.com/office/powerpoint/2010/main" val="3410125167"/>
+      </p:ext>
+    </p:extLst>
+  </p:cSld>
+  <p:clrMapOvr>
+    <a:masterClrMapping/>
+  </p:clrMapOvr>
+  <p:timing>
+    <p:tnLst>
+      <p:par>
+        <p:cTn id="1" dur="indefinite" restart="never" nodeType="tmRoot"/>
+      </p:par>
+    </p:tnLst>
+  </p:timing>
+</p:sld>
+</file>
+
+<file path=ppt/slides/slide12.xml><?xml version="1.0" encoding="utf-8"?>
+<p:sld xmlns:a="http://schemas.openxmlformats.org/drawingml/2006/main" xmlns:r="http://schemas.openxmlformats.org/officeDocument/2006/relationships" xmlns:p="http://schemas.openxmlformats.org/presentationml/2006/main">
+  <p:cSld>
+    <p:spTree>
+      <p:nvGrpSpPr>
+        <p:cNvPr id="1" name=""/>
+        <p:cNvGrpSpPr/>
+        <p:nvPr/>
+      </p:nvGrpSpPr>
+      <p:grpSpPr>
+        <a:xfrm>
+          <a:off x="0" y="0"/>
+          <a:ext cx="0" cy="0"/>
+          <a:chOff x="0" y="0"/>
+          <a:chExt cx="0" cy="0"/>
+        </a:xfrm>
+      </p:grpSpPr>
     </p:spTree>
     <p:extLst>
       <p:ext uri="{BB962C8B-B14F-4D97-AF65-F5344CB8AC3E}">
@@ -6824,14 +7120,14 @@
                 <a:gridCol w="5762625">
                   <a:extLst>
                     <a:ext uri="{9D8B030D-6E8A-4147-A177-3AD203B41FA5}">
-                      <a16:colId xmlns:a16="http://schemas.microsoft.com/office/drawing/2014/main" xmlns="" val="1632794655"/>
+                      <a16:colId xmlns="" xmlns:a16="http://schemas.microsoft.com/office/drawing/2014/main" val="1632794655"/>
                     </a:ext>
                   </a:extLst>
                 </a:gridCol>
                 <a:gridCol w="5762625">
                   <a:extLst>
                     <a:ext uri="{9D8B030D-6E8A-4147-A177-3AD203B41FA5}">
-                      <a16:colId xmlns:a16="http://schemas.microsoft.com/office/drawing/2014/main" xmlns="" val="2011313899"/>
+                      <a16:colId xmlns="" xmlns:a16="http://schemas.microsoft.com/office/drawing/2014/main" val="2011313899"/>
                     </a:ext>
                   </a:extLst>
                 </a:gridCol>
@@ -6869,7 +7165,7 @@
                 </a:tc>
                 <a:extLst>
                   <a:ext uri="{0D108BD9-81ED-4DB2-BD59-A6C34878D82A}">
-                    <a16:rowId xmlns:a16="http://schemas.microsoft.com/office/drawing/2014/main" xmlns="" val="1789177411"/>
+                    <a16:rowId xmlns="" xmlns:a16="http://schemas.microsoft.com/office/drawing/2014/main" val="1789177411"/>
                   </a:ext>
                 </a:extLst>
               </a:tr>
@@ -6930,7 +7226,7 @@
                 </a:tc>
                 <a:extLst>
                   <a:ext uri="{0D108BD9-81ED-4DB2-BD59-A6C34878D82A}">
-                    <a16:rowId xmlns:a16="http://schemas.microsoft.com/office/drawing/2014/main" xmlns="" val="3842815335"/>
+                    <a16:rowId xmlns="" xmlns:a16="http://schemas.microsoft.com/office/drawing/2014/main" val="3842815335"/>
                   </a:ext>
                 </a:extLst>
               </a:tr>
@@ -6977,7 +7273,7 @@
                 </a:tc>
                 <a:extLst>
                   <a:ext uri="{0D108BD9-81ED-4DB2-BD59-A6C34878D82A}">
-                    <a16:rowId xmlns:a16="http://schemas.microsoft.com/office/drawing/2014/main" xmlns="" val="321066646"/>
+                    <a16:rowId xmlns="" xmlns:a16="http://schemas.microsoft.com/office/drawing/2014/main" val="321066646"/>
                   </a:ext>
                 </a:extLst>
               </a:tr>
@@ -7048,7 +7344,7 @@
                 </a:tc>
                 <a:extLst>
                   <a:ext uri="{0D108BD9-81ED-4DB2-BD59-A6C34878D82A}">
-                    <a16:rowId xmlns:a16="http://schemas.microsoft.com/office/drawing/2014/main" xmlns="" val="3812060533"/>
+                    <a16:rowId xmlns="" xmlns:a16="http://schemas.microsoft.com/office/drawing/2014/main" val="3812060533"/>
                   </a:ext>
                 </a:extLst>
               </a:tr>
@@ -7080,21 +7376,7 @@
                           <a:latin typeface="Segoe UI Light" panose="020B0502040204020203" pitchFamily="34" charset="0"/>
                           <a:cs typeface="Segoe UI Light" panose="020B0502040204020203" pitchFamily="34" charset="0"/>
                         </a:rPr>
-                        <a:t>04 | </a:t>
-                      </a:r>
-                      <a:r>
-                        <a:rPr lang="en-US" sz="2400" smtClean="0">
-                          <a:latin typeface="Segoe UI Light" panose="020B0502040204020203" pitchFamily="34" charset="0"/>
-                          <a:cs typeface="Segoe UI Light" panose="020B0502040204020203" pitchFamily="34" charset="0"/>
-                        </a:rPr>
-                        <a:t>Setting Up </a:t>
-                      </a:r>
-                      <a:r>
-                        <a:rPr lang="en-US" sz="2400" dirty="0" smtClean="0">
-                          <a:latin typeface="Segoe UI Light" panose="020B0502040204020203" pitchFamily="34" charset="0"/>
-                          <a:cs typeface="Segoe UI Light" panose="020B0502040204020203" pitchFamily="34" charset="0"/>
-                        </a:rPr>
-                        <a:t>the</a:t>
+                        <a:t>04 | Setting Up the</a:t>
                       </a:r>
                       <a:r>
                         <a:rPr lang="en-US" sz="2400" baseline="0" dirty="0" smtClean="0">
@@ -7306,22 +7588,18 @@
           <a:p>
             <a:r>
               <a:rPr lang="en-GB" dirty="0" smtClean="0"/>
-              <a:t>Section 1</a:t>
+              <a:t>Server architecture</a:t>
             </a:r>
             <a:endParaRPr lang="en-GB" dirty="0"/>
           </a:p>
           <a:p>
             <a:r>
               <a:rPr lang="en-GB" dirty="0" smtClean="0"/>
-              <a:t>Section 2</a:t>
+              <a:t>Creating the Mobile Service</a:t>
             </a:r>
             <a:endParaRPr lang="en-GB" dirty="0"/>
           </a:p>
           <a:p>
-            <a:r>
-              <a:rPr lang="en-GB" dirty="0" smtClean="0"/>
-              <a:t>Section 3</a:t>
-            </a:r>
             <a:endParaRPr lang="en-GB" dirty="0"/>
           </a:p>
         </p:txBody>
@@ -7403,7 +7681,7 @@
           <a:p>
             <a:r>
               <a:rPr lang="en-US" dirty="0" smtClean="0"/>
-              <a:t>Section 1</a:t>
+              <a:t>Server Architecture</a:t>
             </a:r>
             <a:endParaRPr lang="en-US" dirty="0"/>
           </a:p>
@@ -7460,12 +7738,12 @@
       </p:grpSpPr>
       <p:sp>
         <p:nvSpPr>
-          <p:cNvPr id="2" name="Text Placeholder 1"/>
+          <p:cNvPr id="2" name="Title 1"/>
           <p:cNvSpPr>
             <a:spLocks noGrp="1"/>
           </p:cNvSpPr>
           <p:nvPr>
-            <p:ph type="body" sz="quarter" idx="10"/>
+            <p:ph type="title"/>
           </p:nvPr>
         </p:nvSpPr>
         <p:spPr/>
@@ -7475,27 +7753,384 @@
           <a:p>
             <a:r>
               <a:rPr lang="en-US" dirty="0" smtClean="0"/>
-              <a:t>Section 2</a:t>
+              <a:t>Architecture</a:t>
             </a:r>
             <a:endParaRPr lang="en-US" dirty="0"/>
           </a:p>
         </p:txBody>
       </p:sp>
-      <p:sp>
-        <p:nvSpPr>
-          <p:cNvPr id="3" name="Subtitle 2"/>
-          <p:cNvSpPr>
-            <a:spLocks noGrp="1"/>
-          </p:cNvSpPr>
-          <p:nvPr>
-            <p:ph type="subTitle" idx="1"/>
-          </p:nvPr>
-        </p:nvSpPr>
-        <p:spPr/>
+      <p:pic>
+        <p:nvPicPr>
+          <p:cNvPr id="5" name="Picture 4"/>
+          <p:cNvPicPr>
+            <a:picLocks noChangeAspect="1"/>
+          </p:cNvPicPr>
+          <p:nvPr/>
+        </p:nvPicPr>
+        <p:blipFill>
+          <a:blip r:embed="rId2"/>
+          <a:stretch>
+            <a:fillRect/>
+          </a:stretch>
+        </p:blipFill>
+        <p:spPr>
+          <a:xfrm>
+            <a:off x="1701387" y="4569563"/>
+            <a:ext cx="1534482" cy="1415563"/>
+          </a:xfrm>
+          <a:prstGeom prst="rect">
+            <a:avLst/>
+          </a:prstGeom>
+        </p:spPr>
+      </p:pic>
+      <p:pic>
+        <p:nvPicPr>
+          <p:cNvPr id="12" name="Picture 11"/>
+          <p:cNvPicPr>
+            <a:picLocks noChangeAspect="1"/>
+          </p:cNvPicPr>
+          <p:nvPr/>
+        </p:nvPicPr>
+        <p:blipFill>
+          <a:blip r:embed="rId3">
+            <a:duotone>
+              <a:schemeClr val="accent1">
+                <a:shade val="45000"/>
+                <a:satMod val="135000"/>
+              </a:schemeClr>
+              <a:prstClr val="white"/>
+            </a:duotone>
+          </a:blip>
+          <a:stretch>
+            <a:fillRect/>
+          </a:stretch>
+        </p:blipFill>
+        <p:spPr>
+          <a:xfrm>
+            <a:off x="2505156" y="1497196"/>
+            <a:ext cx="1647609" cy="1070239"/>
+          </a:xfrm>
+          <a:prstGeom prst="rect">
+            <a:avLst/>
+          </a:prstGeom>
+        </p:spPr>
+      </p:pic>
+      <p:pic>
+        <p:nvPicPr>
+          <p:cNvPr id="72" name="Picture 71"/>
+          <p:cNvPicPr>
+            <a:picLocks noChangeAspect="1"/>
+          </p:cNvPicPr>
+          <p:nvPr/>
+        </p:nvPicPr>
+        <p:blipFill>
+          <a:blip r:embed="rId4"/>
+          <a:stretch>
+            <a:fillRect/>
+          </a:stretch>
+        </p:blipFill>
+        <p:spPr>
+          <a:xfrm>
+            <a:off x="4553631" y="5487591"/>
+            <a:ext cx="352842" cy="497535"/>
+          </a:xfrm>
+          <a:prstGeom prst="rect">
+            <a:avLst/>
+          </a:prstGeom>
+        </p:spPr>
+      </p:pic>
+      <p:pic>
+        <p:nvPicPr>
+          <p:cNvPr id="73" name="Picture 72"/>
+          <p:cNvPicPr>
+            <a:picLocks noChangeAspect="1"/>
+          </p:cNvPicPr>
+          <p:nvPr/>
+        </p:nvPicPr>
+        <p:blipFill>
+          <a:blip r:embed="rId5"/>
+          <a:stretch>
+            <a:fillRect/>
+          </a:stretch>
+        </p:blipFill>
+        <p:spPr>
+          <a:xfrm>
+            <a:off x="3436063" y="5379405"/>
+            <a:ext cx="917374" cy="605721"/>
+          </a:xfrm>
+          <a:prstGeom prst="rect">
+            <a:avLst/>
+          </a:prstGeom>
+        </p:spPr>
+      </p:pic>
+      <p:sp>
+        <p:nvSpPr>
+          <p:cNvPr id="74" name="TextBox 73"/>
+          <p:cNvSpPr txBox="1"/>
+          <p:nvPr/>
+        </p:nvSpPr>
+        <p:spPr>
+          <a:xfrm>
+            <a:off x="2231127" y="2549498"/>
+            <a:ext cx="2195666" cy="369332"/>
+          </a:xfrm>
+          <a:prstGeom prst="rect">
+            <a:avLst/>
+          </a:prstGeom>
+          <a:noFill/>
+        </p:spPr>
         <p:txBody>
-          <a:bodyPr/>
+          <a:bodyPr wrap="none" rtlCol="0">
+            <a:spAutoFit/>
+          </a:bodyPr>
           <a:lstStyle/>
           <a:p>
+            <a:r>
+              <a:rPr lang="en-US" dirty="0" smtClean="0"/>
+              <a:t>www.frayedknot.com</a:t>
+            </a:r>
+            <a:endParaRPr lang="en-US" dirty="0"/>
+          </a:p>
+        </p:txBody>
+      </p:sp>
+      <p:pic>
+        <p:nvPicPr>
+          <p:cNvPr id="75" name="Picture 74"/>
+          <p:cNvPicPr>
+            <a:picLocks noChangeAspect="1"/>
+          </p:cNvPicPr>
+          <p:nvPr/>
+        </p:nvPicPr>
+        <p:blipFill>
+          <a:blip r:embed="rId3">
+            <a:duotone>
+              <a:schemeClr val="accent1">
+                <a:shade val="45000"/>
+                <a:satMod val="135000"/>
+              </a:schemeClr>
+              <a:prstClr val="white"/>
+            </a:duotone>
+          </a:blip>
+          <a:stretch>
+            <a:fillRect/>
+          </a:stretch>
+        </p:blipFill>
+        <p:spPr>
+          <a:xfrm>
+            <a:off x="6569659" y="1497196"/>
+            <a:ext cx="1647609" cy="1070239"/>
+          </a:xfrm>
+          <a:prstGeom prst="rect">
+            <a:avLst/>
+          </a:prstGeom>
+        </p:spPr>
+      </p:pic>
+      <p:sp>
+        <p:nvSpPr>
+          <p:cNvPr id="76" name="TextBox 75"/>
+          <p:cNvSpPr txBox="1"/>
+          <p:nvPr/>
+        </p:nvSpPr>
+        <p:spPr>
+          <a:xfrm>
+            <a:off x="6295630" y="2549498"/>
+            <a:ext cx="1998624" cy="369332"/>
+          </a:xfrm>
+          <a:prstGeom prst="rect">
+            <a:avLst/>
+          </a:prstGeom>
+          <a:noFill/>
+        </p:spPr>
+        <p:txBody>
+          <a:bodyPr wrap="none" rtlCol="0">
+            <a:spAutoFit/>
+          </a:bodyPr>
+          <a:lstStyle/>
+          <a:p>
+            <a:r>
+              <a:rPr lang="en-US" dirty="0" smtClean="0"/>
+              <a:t>api.frayedknot.com</a:t>
+            </a:r>
+            <a:endParaRPr lang="en-US" dirty="0"/>
+          </a:p>
+        </p:txBody>
+      </p:sp>
+      <p:pic>
+        <p:nvPicPr>
+          <p:cNvPr id="77" name="Picture 76"/>
+          <p:cNvPicPr>
+            <a:picLocks noChangeAspect="1"/>
+          </p:cNvPicPr>
+          <p:nvPr/>
+        </p:nvPicPr>
+        <p:blipFill>
+          <a:blip r:embed="rId3">
+            <a:duotone>
+              <a:schemeClr val="accent1">
+                <a:shade val="45000"/>
+                <a:satMod val="135000"/>
+              </a:schemeClr>
+              <a:prstClr val="white"/>
+            </a:duotone>
+          </a:blip>
+          <a:stretch>
+            <a:fillRect/>
+          </a:stretch>
+        </p:blipFill>
+        <p:spPr>
+          <a:xfrm>
+            <a:off x="9039354" y="1497196"/>
+            <a:ext cx="1647609" cy="1070239"/>
+          </a:xfrm>
+          <a:prstGeom prst="rect">
+            <a:avLst/>
+          </a:prstGeom>
+        </p:spPr>
+      </p:pic>
+      <p:sp>
+        <p:nvSpPr>
+          <p:cNvPr id="78" name="TextBox 77"/>
+          <p:cNvSpPr txBox="1"/>
+          <p:nvPr/>
+        </p:nvSpPr>
+        <p:spPr>
+          <a:xfrm>
+            <a:off x="8765325" y="2549498"/>
+            <a:ext cx="2195666" cy="369332"/>
+          </a:xfrm>
+          <a:prstGeom prst="rect">
+            <a:avLst/>
+          </a:prstGeom>
+          <a:noFill/>
+        </p:spPr>
+        <p:txBody>
+          <a:bodyPr wrap="none" rtlCol="0">
+            <a:spAutoFit/>
+          </a:bodyPr>
+          <a:lstStyle/>
+          <a:p>
+            <a:r>
+              <a:rPr lang="en-US" dirty="0" smtClean="0"/>
+              <a:t>www.frayedknot.com</a:t>
+            </a:r>
+            <a:endParaRPr lang="en-US" dirty="0"/>
+          </a:p>
+        </p:txBody>
+      </p:sp>
+      <p:pic>
+        <p:nvPicPr>
+          <p:cNvPr id="79" name="Picture 78"/>
+          <p:cNvPicPr>
+            <a:picLocks noChangeAspect="1"/>
+          </p:cNvPicPr>
+          <p:nvPr/>
+        </p:nvPicPr>
+        <p:blipFill>
+          <a:blip r:embed="rId2"/>
+          <a:stretch>
+            <a:fillRect/>
+          </a:stretch>
+        </p:blipFill>
+        <p:spPr>
+          <a:xfrm>
+            <a:off x="6945192" y="4569563"/>
+            <a:ext cx="1534482" cy="1415563"/>
+          </a:xfrm>
+          <a:prstGeom prst="rect">
+            <a:avLst/>
+          </a:prstGeom>
+        </p:spPr>
+      </p:pic>
+      <p:pic>
+        <p:nvPicPr>
+          <p:cNvPr id="80" name="Picture 79"/>
+          <p:cNvPicPr>
+            <a:picLocks noChangeAspect="1"/>
+          </p:cNvPicPr>
+          <p:nvPr/>
+        </p:nvPicPr>
+        <p:blipFill>
+          <a:blip r:embed="rId4"/>
+          <a:stretch>
+            <a:fillRect/>
+          </a:stretch>
+        </p:blipFill>
+        <p:spPr>
+          <a:xfrm>
+            <a:off x="9797436" y="5487591"/>
+            <a:ext cx="352842" cy="497535"/>
+          </a:xfrm>
+          <a:prstGeom prst="rect">
+            <a:avLst/>
+          </a:prstGeom>
+        </p:spPr>
+      </p:pic>
+      <p:pic>
+        <p:nvPicPr>
+          <p:cNvPr id="81" name="Picture 80"/>
+          <p:cNvPicPr>
+            <a:picLocks noChangeAspect="1"/>
+          </p:cNvPicPr>
+          <p:nvPr/>
+        </p:nvPicPr>
+        <p:blipFill>
+          <a:blip r:embed="rId5"/>
+          <a:stretch>
+            <a:fillRect/>
+          </a:stretch>
+        </p:blipFill>
+        <p:spPr>
+          <a:xfrm>
+            <a:off x="8679868" y="5379405"/>
+            <a:ext cx="917374" cy="605721"/>
+          </a:xfrm>
+          <a:prstGeom prst="rect">
+            <a:avLst/>
+          </a:prstGeom>
+        </p:spPr>
+      </p:pic>
+      <p:sp>
+        <p:nvSpPr>
+          <p:cNvPr id="82" name="Rectangle 81"/>
+          <p:cNvSpPr/>
+          <p:nvPr/>
+        </p:nvSpPr>
+        <p:spPr>
+          <a:xfrm>
+            <a:off x="5651573" y="2032315"/>
+            <a:ext cx="120006" cy="3732245"/>
+          </a:xfrm>
+          <a:prstGeom prst="rect">
+            <a:avLst/>
+          </a:prstGeom>
+          <a:solidFill>
+            <a:schemeClr val="tx1"/>
+          </a:solidFill>
+          <a:ln>
+            <a:noFill/>
+          </a:ln>
+        </p:spPr>
+        <p:style>
+          <a:lnRef idx="2">
+            <a:schemeClr val="accent1">
+              <a:shade val="50000"/>
+            </a:schemeClr>
+          </a:lnRef>
+          <a:fillRef idx="1">
+            <a:schemeClr val="accent1"/>
+          </a:fillRef>
+          <a:effectRef idx="0">
+            <a:schemeClr val="accent1"/>
+          </a:effectRef>
+          <a:fontRef idx="minor">
+            <a:schemeClr val="lt1"/>
+          </a:fontRef>
+        </p:style>
+        <p:txBody>
+          <a:bodyPr rtlCol="0" anchor="ctr"/>
+          <a:lstStyle/>
+          <a:p>
+            <a:pPr algn="ctr"/>
             <a:endParaRPr lang="en-US"/>
           </a:p>
         </p:txBody>
@@ -7503,7 +8138,7 @@
     </p:spTree>
     <p:extLst>
       <p:ext uri="{BB962C8B-B14F-4D97-AF65-F5344CB8AC3E}">
-        <p14:creationId xmlns:p14="http://schemas.microsoft.com/office/powerpoint/2010/main" val="4190290233"/>
+        <p14:creationId xmlns:p14="http://schemas.microsoft.com/office/powerpoint/2010/main" val="2534071025"/>
       </p:ext>
     </p:extLst>
   </p:cSld>
@@ -7532,12 +8167,12 @@
       </p:grpSpPr>
       <p:sp>
         <p:nvSpPr>
-          <p:cNvPr id="2" name="Text Placeholder 1"/>
+          <p:cNvPr id="2" name="Title 1"/>
           <p:cNvSpPr>
             <a:spLocks noGrp="1"/>
           </p:cNvSpPr>
           <p:nvPr>
-            <p:ph type="body" sz="quarter" idx="10"/>
+            <p:ph type="title"/>
           </p:nvPr>
         </p:nvSpPr>
         <p:spPr/>
@@ -7547,7 +8182,7 @@
           <a:p>
             <a:r>
               <a:rPr lang="en-US" dirty="0" smtClean="0"/>
-              <a:t>Section 3</a:t>
+              <a:t>Server Options</a:t>
             </a:r>
             <a:endParaRPr lang="en-US" dirty="0"/>
           </a:p>
@@ -7555,12 +8190,12 @@
       </p:sp>
       <p:sp>
         <p:nvSpPr>
-          <p:cNvPr id="3" name="Subtitle 2"/>
+          <p:cNvPr id="3" name="Content Placeholder 2"/>
           <p:cNvSpPr>
             <a:spLocks noGrp="1"/>
           </p:cNvSpPr>
           <p:nvPr>
-            <p:ph type="subTitle" idx="1"/>
+            <p:ph sz="quarter" idx="10"/>
           </p:nvPr>
         </p:nvSpPr>
         <p:spPr/>
@@ -7568,14 +8203,65 @@
           <a:bodyPr/>
           <a:lstStyle/>
           <a:p>
-            <a:endParaRPr lang="en-US"/>
+            <a:r>
+              <a:rPr lang="en-US" dirty="0" smtClean="0"/>
+              <a:t>ASP.NET MVC</a:t>
+            </a:r>
+          </a:p>
+          <a:p>
+            <a:r>
+              <a:rPr lang="en-US" dirty="0" smtClean="0"/>
+              <a:t>ASP.NET Web API</a:t>
+            </a:r>
+          </a:p>
+          <a:p>
+            <a:r>
+              <a:rPr lang="en-US" dirty="0" smtClean="0"/>
+              <a:t>node.js</a:t>
+            </a:r>
+          </a:p>
+          <a:p>
+            <a:r>
+              <a:rPr lang="en-US" dirty="0" smtClean="0"/>
+              <a:t>Backend as a service (</a:t>
+            </a:r>
+            <a:r>
+              <a:rPr lang="en-US" dirty="0" err="1" smtClean="0"/>
+              <a:t>BaaS</a:t>
+            </a:r>
+            <a:r>
+              <a:rPr lang="en-US" dirty="0" smtClean="0"/>
+              <a:t>)</a:t>
+            </a:r>
+          </a:p>
+          <a:p>
+            <a:pPr lvl="1"/>
+            <a:r>
+              <a:rPr lang="en-US" dirty="0" smtClean="0"/>
+              <a:t>Azure Mobile Services (C# or JavaScript)</a:t>
+            </a:r>
+          </a:p>
+          <a:p>
+            <a:pPr lvl="1"/>
+            <a:r>
+              <a:rPr lang="en-US" dirty="0" smtClean="0"/>
+              <a:t>Buddy.com</a:t>
+            </a:r>
+          </a:p>
+          <a:p>
+            <a:pPr lvl="1"/>
+            <a:r>
+              <a:rPr lang="en-US" dirty="0" smtClean="0"/>
+              <a:t>Parse.com</a:t>
+            </a:r>
+            <a:endParaRPr lang="en-US" dirty="0"/>
           </a:p>
         </p:txBody>
       </p:sp>
     </p:spTree>
     <p:extLst>
       <p:ext uri="{BB962C8B-B14F-4D97-AF65-F5344CB8AC3E}">
-        <p14:creationId xmlns:p14="http://schemas.microsoft.com/office/powerpoint/2010/main" val="4243374243"/>
+        <p14:creationId xmlns:p14="http://schemas.microsoft.com/office/powerpoint/2010/main" val="589837098"/>
       </p:ext>
     </p:extLst>
   </p:cSld>
@@ -7604,33 +8290,35 @@
       </p:grpSpPr>
       <p:sp>
         <p:nvSpPr>
-          <p:cNvPr id="7" name="Content Placeholder 6"/>
+          <p:cNvPr id="2" name="Text Placeholder 1"/>
           <p:cNvSpPr>
             <a:spLocks noGrp="1"/>
           </p:cNvSpPr>
           <p:nvPr>
-            <p:ph sz="quarter" idx="10"/>
+            <p:ph type="body" sz="quarter" idx="10"/>
           </p:nvPr>
         </p:nvSpPr>
         <p:spPr/>
         <p:txBody>
-          <a:bodyPr>
-            <a:normAutofit/>
-          </a:bodyPr>
+          <a:bodyPr/>
           <a:lstStyle/>
           <a:p>
-            <a:endParaRPr lang="en-GB" dirty="0"/>
+            <a:r>
+              <a:rPr lang="en-US" dirty="0" smtClean="0"/>
+              <a:t>Creating the Mobile Service</a:t>
+            </a:r>
+            <a:endParaRPr lang="en-US" dirty="0"/>
           </a:p>
         </p:txBody>
       </p:sp>
       <p:sp>
         <p:nvSpPr>
-          <p:cNvPr id="2" name="Title 1"/>
+          <p:cNvPr id="3" name="Subtitle 2"/>
           <p:cNvSpPr>
             <a:spLocks noGrp="1"/>
           </p:cNvSpPr>
           <p:nvPr>
-            <p:ph type="title"/>
+            <p:ph type="subTitle" idx="1"/>
           </p:nvPr>
         </p:nvSpPr>
         <p:spPr/>
@@ -7638,31 +8326,20 @@
           <a:bodyPr/>
           <a:lstStyle/>
           <a:p>
-            <a:r>
-              <a:rPr lang="en-US" dirty="0" smtClean="0"/>
-              <a:t>Resources</a:t>
-            </a:r>
-            <a:endParaRPr lang="en-US" dirty="0"/>
+            <a:endParaRPr lang="en-US"/>
           </a:p>
         </p:txBody>
       </p:sp>
     </p:spTree>
     <p:extLst>
       <p:ext uri="{BB962C8B-B14F-4D97-AF65-F5344CB8AC3E}">
-        <p14:creationId xmlns:p14="http://schemas.microsoft.com/office/powerpoint/2010/main" val="2567384094"/>
+        <p14:creationId xmlns:p14="http://schemas.microsoft.com/office/powerpoint/2010/main" val="4190290233"/>
       </p:ext>
     </p:extLst>
   </p:cSld>
   <p:clrMapOvr>
     <a:masterClrMapping/>
   </p:clrMapOvr>
-  <p:timing>
-    <p:tnLst>
-      <p:par>
-        <p:cTn id="1" dur="indefinite" restart="never" nodeType="tmRoot"/>
-      </p:par>
-    </p:tnLst>
-  </p:timing>
 </p:sld>
 </file>
 
@@ -7685,43 +8362,6 @@
       </p:grpSpPr>
       <p:sp>
         <p:nvSpPr>
-          <p:cNvPr id="7" name="Content Placeholder 6"/>
-          <p:cNvSpPr>
-            <a:spLocks noGrp="1"/>
-          </p:cNvSpPr>
-          <p:nvPr>
-            <p:ph sz="quarter" idx="10"/>
-          </p:nvPr>
-        </p:nvSpPr>
-        <p:spPr/>
-        <p:txBody>
-          <a:bodyPr>
-            <a:normAutofit/>
-          </a:bodyPr>
-          <a:lstStyle/>
-          <a:p>
-            <a:r>
-              <a:rPr lang="en-GB" dirty="0" smtClean="0"/>
-              <a:t>Section 1</a:t>
-            </a:r>
-          </a:p>
-          <a:p>
-            <a:r>
-              <a:rPr lang="en-GB" dirty="0" smtClean="0"/>
-              <a:t>Section 2</a:t>
-            </a:r>
-          </a:p>
-          <a:p>
-            <a:r>
-              <a:rPr lang="en-GB" dirty="0" smtClean="0"/>
-              <a:t>Section 3</a:t>
-            </a:r>
-            <a:endParaRPr lang="en-GB" dirty="0"/>
-          </a:p>
-        </p:txBody>
-      </p:sp>
-      <p:sp>
-        <p:nvSpPr>
           <p:cNvPr id="2" name="Title 1"/>
           <p:cNvSpPr>
             <a:spLocks noGrp="1"/>
@@ -7737,7 +8377,21 @@
           <a:p>
             <a:r>
               <a:rPr lang="en-US" dirty="0" smtClean="0"/>
-              <a:t>Summary</a:t>
+              <a:t>Creating an Azure Mobile Service</a:t>
+            </a:r>
+            <a:br>
+              <a:rPr lang="en-US" dirty="0" smtClean="0"/>
+            </a:br>
+            <a:r>
+              <a:rPr lang="en-US" dirty="0" smtClean="0"/>
+              <a:t>Adding data</a:t>
+            </a:r>
+            <a:br>
+              <a:rPr lang="en-US" dirty="0" smtClean="0"/>
+            </a:br>
+            <a:r>
+              <a:rPr lang="en-US" dirty="0" smtClean="0"/>
+              <a:t>Creating API method</a:t>
             </a:r>
             <a:endParaRPr lang="en-US" dirty="0"/>
           </a:p>
@@ -7746,20 +8400,13 @@
     </p:spTree>
     <p:extLst>
       <p:ext uri="{BB962C8B-B14F-4D97-AF65-F5344CB8AC3E}">
-        <p14:creationId xmlns:p14="http://schemas.microsoft.com/office/powerpoint/2010/main" val="393125443"/>
+        <p14:creationId xmlns:p14="http://schemas.microsoft.com/office/powerpoint/2010/main" val="3936118977"/>
       </p:ext>
     </p:extLst>
   </p:cSld>
   <p:clrMapOvr>
     <a:masterClrMapping/>
   </p:clrMapOvr>
-  <p:timing>
-    <p:tnLst>
-      <p:par>
-        <p:cTn id="1" dur="indefinite" restart="never" nodeType="tmRoot"/>
-      </p:par>
-    </p:tnLst>
-  </p:timing>
 </p:sld>
 </file>
 
@@ -8856,12 +9503,9 @@
 </file>
 
 <file path=customXml/item1.xml><?xml version="1.0" encoding="utf-8"?>
-<?mso-contentType ?>
-<FormTemplates xmlns="http://schemas.microsoft.com/sharepoint/v3/contenttype/forms">
-  <Display>DocumentLibraryForm</Display>
-  <Edit>DocumentLibraryForm</Edit>
-  <New>DocumentLibraryForm</New>
-</FormTemplates>
+<p:properties xmlns:p="http://schemas.microsoft.com/office/2006/metadata/properties" xmlns:xsi="http://www.w3.org/2001/XMLSchema-instance" xmlns:pc="http://schemas.microsoft.com/office/infopath/2007/PartnerControls">
+  <documentManagement/>
+</p:properties>
 </file>
 
 <file path=customXml/item2.xml><?xml version="1.0" encoding="utf-8"?>
@@ -9005,15 +9649,26 @@
 </file>
 
 <file path=customXml/item3.xml><?xml version="1.0" encoding="utf-8"?>
-<p:properties xmlns:p="http://schemas.microsoft.com/office/2006/metadata/properties" xmlns:xsi="http://www.w3.org/2001/XMLSchema-instance" xmlns:pc="http://schemas.microsoft.com/office/infopath/2007/PartnerControls">
-  <documentManagement/>
-</p:properties>
+<?mso-contentType ?>
+<FormTemplates xmlns="http://schemas.microsoft.com/sharepoint/v3/contenttype/forms">
+  <Display>DocumentLibraryForm</Display>
+  <Edit>DocumentLibraryForm</Edit>
+  <New>DocumentLibraryForm</New>
+</FormTemplates>
 </file>
 
 <file path=customXml/itemProps1.xml><?xml version="1.0" encoding="utf-8"?>
-<ds:datastoreItem xmlns:ds="http://schemas.openxmlformats.org/officeDocument/2006/customXml" ds:itemID="{B0CA13EC-1D3C-4D6F-8D1C-E8A452CFC79A}">
+<ds:datastoreItem xmlns:ds="http://schemas.openxmlformats.org/officeDocument/2006/customXml" ds:itemID="{7025FDD9-4C58-4084-9F89-0E6ADD6FFF55}">
   <ds:schemaRefs>
-    <ds:schemaRef ds:uri="http://schemas.microsoft.com/sharepoint/v3/contenttype/forms"/>
+    <ds:schemaRef ds:uri="http://schemas.microsoft.com/office/2006/metadata/properties"/>
+    <ds:schemaRef ds:uri="http://purl.org/dc/terms/"/>
+    <ds:schemaRef ds:uri="http://schemas.openxmlformats.org/package/2006/metadata/core-properties"/>
+    <ds:schemaRef ds:uri="http://schemas.microsoft.com/office/2006/documentManagement/types"/>
+    <ds:schemaRef ds:uri="http://purl.org/dc/dcmitype/"/>
+    <ds:schemaRef ds:uri="http://schemas.microsoft.com/office/infopath/2007/PartnerControls"/>
+    <ds:schemaRef ds:uri="ecd1fa32-ae44-48d6-80a1-71a52da60b4a"/>
+    <ds:schemaRef ds:uri="http://purl.org/dc/elements/1.1/"/>
+    <ds:schemaRef ds:uri="http://www.w3.org/XML/1998/namespace"/>
   </ds:schemaRefs>
 </ds:datastoreItem>
 </file>
@@ -9037,17 +9692,9 @@
 </file>
 
 <file path=customXml/itemProps3.xml><?xml version="1.0" encoding="utf-8"?>
-<ds:datastoreItem xmlns:ds="http://schemas.openxmlformats.org/officeDocument/2006/customXml" ds:itemID="{7025FDD9-4C58-4084-9F89-0E6ADD6FFF55}">
+<ds:datastoreItem xmlns:ds="http://schemas.openxmlformats.org/officeDocument/2006/customXml" ds:itemID="{B0CA13EC-1D3C-4D6F-8D1C-E8A452CFC79A}">
   <ds:schemaRefs>
-    <ds:schemaRef ds:uri="http://schemas.microsoft.com/office/2006/metadata/properties"/>
-    <ds:schemaRef ds:uri="http://purl.org/dc/terms/"/>
-    <ds:schemaRef ds:uri="http://schemas.openxmlformats.org/package/2006/metadata/core-properties"/>
-    <ds:schemaRef ds:uri="http://schemas.microsoft.com/office/2006/documentManagement/types"/>
-    <ds:schemaRef ds:uri="http://purl.org/dc/dcmitype/"/>
-    <ds:schemaRef ds:uri="http://schemas.microsoft.com/office/infopath/2007/PartnerControls"/>
-    <ds:schemaRef ds:uri="ecd1fa32-ae44-48d6-80a1-71a52da60b4a"/>
-    <ds:schemaRef ds:uri="http://purl.org/dc/elements/1.1/"/>
-    <ds:schemaRef ds:uri="http://www.w3.org/XML/1998/namespace"/>
+    <ds:schemaRef ds:uri="http://schemas.microsoft.com/sharepoint/v3/contenttype/forms"/>
   </ds:schemaRefs>
 </ds:datastoreItem>
 </file>
</xml_diff>

<commit_message>
M4 and M5 slide updates
</commit_message>
<xml_diff>
--- a/Slides/M4 Server.pptx
+++ b/Slides/M4 Server.pptx
@@ -1095,13 +1095,9 @@
             </a:r>
             <a:r>
               <a:rPr lang="en-US" baseline="0" dirty="0" smtClean="0"/>
-              <a:t>, show the PowerShell functions for simple get </a:t>
-            </a:r>
-            <a:r>
-              <a:rPr lang="en-US" baseline="0" smtClean="0"/>
-              <a:t>and post</a:t>
-            </a:r>
-            <a:endParaRPr lang="en-US"/>
+              <a:t>, show the PowerShell functions for simple get and post</a:t>
+            </a:r>
+            <a:endParaRPr lang="en-US" dirty="0"/>
           </a:p>
         </p:txBody>
       </p:sp>

</xml_diff>

<commit_message>
add new section to module 4 slide deck
</commit_message>
<xml_diff>
--- a/Slides/M4 Server.pptx
+++ b/Slides/M4 Server.pptx
@@ -6,10 +6,10 @@
     <p:sldMasterId id="2147483674" r:id="rId5"/>
   </p:sldMasterIdLst>
   <p:notesMasterIdLst>
-    <p:notesMasterId r:id="rId18"/>
+    <p:notesMasterId r:id="rId21"/>
   </p:notesMasterIdLst>
   <p:handoutMasterIdLst>
-    <p:handoutMasterId r:id="rId19"/>
+    <p:handoutMasterId r:id="rId22"/>
   </p:handoutMasterIdLst>
   <p:sldIdLst>
     <p:sldId id="459" r:id="rId6"/>
@@ -21,9 +21,12 @@
     <p:sldId id="462" r:id="rId12"/>
     <p:sldId id="447" r:id="rId13"/>
     <p:sldId id="463" r:id="rId14"/>
-    <p:sldId id="454" r:id="rId15"/>
-    <p:sldId id="464" r:id="rId16"/>
-    <p:sldId id="269" r:id="rId17"/>
+    <p:sldId id="465" r:id="rId15"/>
+    <p:sldId id="466" r:id="rId16"/>
+    <p:sldId id="468" r:id="rId17"/>
+    <p:sldId id="454" r:id="rId18"/>
+    <p:sldId id="464" r:id="rId19"/>
+    <p:sldId id="269" r:id="rId20"/>
   </p:sldIdLst>
   <p:sldSz cx="12192000" cy="6858000"/>
   <p:notesSz cx="6858000" cy="9144000"/>
@@ -140,6 +143,9 @@
             <p14:sldId id="462"/>
             <p14:sldId id="447"/>
             <p14:sldId id="463"/>
+            <p14:sldId id="465"/>
+            <p14:sldId id="466"/>
+            <p14:sldId id="468"/>
             <p14:sldId id="454"/>
             <p14:sldId id="464"/>
           </p14:sldIdLst>
@@ -1178,17 +1184,52 @@
         </p:nvSpPr>
         <p:spPr/>
         <p:txBody>
-          <a:bodyPr>
-            <a:noAutofit/>
-          </a:bodyPr>
+          <a:bodyPr/>
           <a:lstStyle/>
           <a:p>
-            <a:endParaRPr lang="en-GB" dirty="0">
-              <a:solidFill>
-                <a:schemeClr val="tx2"/>
-              </a:solidFill>
-              <a:latin typeface="Segoe" pitchFamily="34" charset="0"/>
-            </a:endParaRPr>
+            <a:r>
+              <a:rPr lang="en-US" dirty="0" smtClean="0"/>
+              <a:t>Compare…</a:t>
+            </a:r>
+          </a:p>
+          <a:p>
+            <a:r>
+              <a:rPr lang="en-US" dirty="0" smtClean="0"/>
+              <a:t>http://services.odata.org/V</a:t>
+            </a:r>
+            <a:r>
+              <a:rPr lang="en-US" b="0" dirty="0" smtClean="0"/>
+              <a:t>3</a:t>
+            </a:r>
+            <a:r>
+              <a:rPr lang="en-US" dirty="0" smtClean="0"/>
+              <a:t>/OData/OData.svc/Products?$top=10</a:t>
+            </a:r>
+          </a:p>
+          <a:p>
+            <a:r>
+              <a:rPr lang="en-US" dirty="0" smtClean="0"/>
+              <a:t>http://services.odata.org/V</a:t>
+            </a:r>
+            <a:r>
+              <a:rPr lang="en-US" b="1" dirty="0" smtClean="0"/>
+              <a:t>4</a:t>
+            </a:r>
+            <a:r>
+              <a:rPr lang="en-US" dirty="0" smtClean="0"/>
+              <a:t>/OData/OData.svc/Products?$top=10</a:t>
+            </a:r>
+          </a:p>
+          <a:p>
+            <a:r>
+              <a:rPr lang="en-US" dirty="0" smtClean="0"/>
+              <a:t>http://services.odata.org/V4/OData/OData.svc/Products?$top=10</a:t>
+            </a:r>
+            <a:r>
+              <a:rPr lang="en-US" b="1" dirty="0" smtClean="0"/>
+              <a:t>&amp;$select=Name</a:t>
+            </a:r>
+            <a:endParaRPr lang="en-US" b="1" dirty="0"/>
           </a:p>
         </p:txBody>
       </p:sp>
@@ -1207,19 +1248,18 @@
           <a:bodyPr/>
           <a:lstStyle/>
           <a:p>
-            <a:fld id="{13F0F35F-DD44-4607-AEC1-49D7A4BC4066}" type="slidenum">
+            <a:fld id="{4CFD207A-07DF-40AD-A916-9872E089CE7A}" type="slidenum">
               <a:rPr lang="en-US" smtClean="0"/>
-              <a:pPr/>
-              <a:t>10</a:t>
+              <a:t>12</a:t>
             </a:fld>
-            <a:endParaRPr lang="en-US" dirty="0"/>
+            <a:endParaRPr lang="en-US"/>
           </a:p>
         </p:txBody>
       </p:sp>
     </p:spTree>
     <p:extLst>
       <p:ext uri="{BB962C8B-B14F-4D97-AF65-F5344CB8AC3E}">
-        <p14:creationId xmlns:p14="http://schemas.microsoft.com/office/powerpoint/2010/main" val="3625277357"/>
+        <p14:creationId xmlns:p14="http://schemas.microsoft.com/office/powerpoint/2010/main" val="3778762008"/>
       </p:ext>
     </p:extLst>
   </p:cSld>
@@ -1302,7 +1342,99 @@
             <a:fld id="{13F0F35F-DD44-4607-AEC1-49D7A4BC4066}" type="slidenum">
               <a:rPr lang="en-US" smtClean="0"/>
               <a:pPr/>
-              <a:t>11</a:t>
+              <a:t>13</a:t>
+            </a:fld>
+            <a:endParaRPr lang="en-US" dirty="0"/>
+          </a:p>
+        </p:txBody>
+      </p:sp>
+    </p:spTree>
+    <p:extLst>
+      <p:ext uri="{BB962C8B-B14F-4D97-AF65-F5344CB8AC3E}">
+        <p14:creationId xmlns:p14="http://schemas.microsoft.com/office/powerpoint/2010/main" val="3625277357"/>
+      </p:ext>
+    </p:extLst>
+  </p:cSld>
+  <p:clrMapOvr>
+    <a:masterClrMapping/>
+  </p:clrMapOvr>
+</p:notes>
+</file>
+
+<file path=ppt/notesSlides/notesSlide8.xml><?xml version="1.0" encoding="utf-8"?>
+<p:notes xmlns:a="http://schemas.openxmlformats.org/drawingml/2006/main" xmlns:r="http://schemas.openxmlformats.org/officeDocument/2006/relationships" xmlns:p="http://schemas.openxmlformats.org/presentationml/2006/main">
+  <p:cSld>
+    <p:spTree>
+      <p:nvGrpSpPr>
+        <p:cNvPr id="1" name=""/>
+        <p:cNvGrpSpPr/>
+        <p:nvPr/>
+      </p:nvGrpSpPr>
+      <p:grpSpPr>
+        <a:xfrm>
+          <a:off x="0" y="0"/>
+          <a:ext cx="0" cy="0"/>
+          <a:chOff x="0" y="0"/>
+          <a:chExt cx="0" cy="0"/>
+        </a:xfrm>
+      </p:grpSpPr>
+      <p:sp>
+        <p:nvSpPr>
+          <p:cNvPr id="2" name="Slide Image Placeholder 1"/>
+          <p:cNvSpPr>
+            <a:spLocks noGrp="1" noRot="1" noChangeAspect="1"/>
+          </p:cNvSpPr>
+          <p:nvPr>
+            <p:ph type="sldImg"/>
+          </p:nvPr>
+        </p:nvSpPr>
+        <p:spPr/>
+      </p:sp>
+      <p:sp>
+        <p:nvSpPr>
+          <p:cNvPr id="3" name="Notes Placeholder 2"/>
+          <p:cNvSpPr>
+            <a:spLocks noGrp="1"/>
+          </p:cNvSpPr>
+          <p:nvPr>
+            <p:ph type="body" idx="1"/>
+          </p:nvPr>
+        </p:nvSpPr>
+        <p:spPr/>
+        <p:txBody>
+          <a:bodyPr>
+            <a:noAutofit/>
+          </a:bodyPr>
+          <a:lstStyle/>
+          <a:p>
+            <a:endParaRPr lang="en-GB" dirty="0">
+              <a:solidFill>
+                <a:schemeClr val="tx2"/>
+              </a:solidFill>
+              <a:latin typeface="Segoe" pitchFamily="34" charset="0"/>
+            </a:endParaRPr>
+          </a:p>
+        </p:txBody>
+      </p:sp>
+      <p:sp>
+        <p:nvSpPr>
+          <p:cNvPr id="4" name="Slide Number Placeholder 3"/>
+          <p:cNvSpPr>
+            <a:spLocks noGrp="1"/>
+          </p:cNvSpPr>
+          <p:nvPr>
+            <p:ph type="sldNum" sz="quarter" idx="10"/>
+          </p:nvPr>
+        </p:nvSpPr>
+        <p:spPr/>
+        <p:txBody>
+          <a:bodyPr/>
+          <a:lstStyle/>
+          <a:p>
+            <a:fld id="{13F0F35F-DD44-4607-AEC1-49D7A4BC4066}" type="slidenum">
+              <a:rPr lang="en-US" smtClean="0"/>
+              <a:pPr/>
+              <a:t>14</a:t>
             </a:fld>
             <a:endParaRPr lang="en-US" dirty="0"/>
           </a:p>
@@ -6845,6 +6977,248 @@
       </p:grpSpPr>
       <p:sp>
         <p:nvSpPr>
+          <p:cNvPr id="2" name="Text Placeholder 1"/>
+          <p:cNvSpPr>
+            <a:spLocks noGrp="1"/>
+          </p:cNvSpPr>
+          <p:nvPr>
+            <p:ph type="body" sz="quarter" idx="10"/>
+          </p:nvPr>
+        </p:nvSpPr>
+        <p:spPr/>
+        <p:txBody>
+          <a:bodyPr/>
+          <a:lstStyle/>
+          <a:p>
+            <a:r>
+              <a:rPr lang="en-US" dirty="0" smtClean="0"/>
+              <a:t>Considerations for mobile sites</a:t>
+            </a:r>
+            <a:endParaRPr lang="en-US" dirty="0"/>
+          </a:p>
+        </p:txBody>
+      </p:sp>
+      <p:sp>
+        <p:nvSpPr>
+          <p:cNvPr id="3" name="Subtitle 2"/>
+          <p:cNvSpPr>
+            <a:spLocks noGrp="1"/>
+          </p:cNvSpPr>
+          <p:nvPr>
+            <p:ph type="subTitle" idx="1"/>
+          </p:nvPr>
+        </p:nvSpPr>
+        <p:spPr/>
+        <p:txBody>
+          <a:bodyPr/>
+          <a:lstStyle/>
+          <a:p>
+            <a:endParaRPr lang="en-US"/>
+          </a:p>
+        </p:txBody>
+      </p:sp>
+    </p:spTree>
+    <p:extLst>
+      <p:ext uri="{BB962C8B-B14F-4D97-AF65-F5344CB8AC3E}">
+        <p14:creationId xmlns:p14="http://schemas.microsoft.com/office/powerpoint/2010/main" val="471336882"/>
+      </p:ext>
+    </p:extLst>
+  </p:cSld>
+  <p:clrMapOvr>
+    <a:masterClrMapping/>
+  </p:clrMapOvr>
+</p:sld>
+</file>
+
+<file path=ppt/slides/slide11.xml><?xml version="1.0" encoding="utf-8"?>
+<p:sld xmlns:a="http://schemas.openxmlformats.org/drawingml/2006/main" xmlns:r="http://schemas.openxmlformats.org/officeDocument/2006/relationships" xmlns:p="http://schemas.openxmlformats.org/presentationml/2006/main">
+  <p:cSld>
+    <p:spTree>
+      <p:nvGrpSpPr>
+        <p:cNvPr id="1" name=""/>
+        <p:cNvGrpSpPr/>
+        <p:nvPr/>
+      </p:nvGrpSpPr>
+      <p:grpSpPr>
+        <a:xfrm>
+          <a:off x="0" y="0"/>
+          <a:ext cx="0" cy="0"/>
+          <a:chOff x="0" y="0"/>
+          <a:chExt cx="0" cy="0"/>
+        </a:xfrm>
+      </p:grpSpPr>
+      <p:sp>
+        <p:nvSpPr>
+          <p:cNvPr id="2" name="Title 1"/>
+          <p:cNvSpPr>
+            <a:spLocks noGrp="1"/>
+          </p:cNvSpPr>
+          <p:nvPr>
+            <p:ph type="title"/>
+          </p:nvPr>
+        </p:nvSpPr>
+        <p:spPr/>
+        <p:txBody>
+          <a:bodyPr/>
+          <a:lstStyle/>
+          <a:p>
+            <a:r>
+              <a:rPr lang="en-US" dirty="0" smtClean="0"/>
+              <a:t>Things to think about…</a:t>
+            </a:r>
+            <a:endParaRPr lang="en-US" dirty="0"/>
+          </a:p>
+        </p:txBody>
+      </p:sp>
+      <p:sp>
+        <p:nvSpPr>
+          <p:cNvPr id="3" name="Content Placeholder 2"/>
+          <p:cNvSpPr>
+            <a:spLocks noGrp="1"/>
+          </p:cNvSpPr>
+          <p:nvPr>
+            <p:ph sz="quarter" idx="10"/>
+          </p:nvPr>
+        </p:nvSpPr>
+        <p:spPr/>
+        <p:txBody>
+          <a:bodyPr/>
+          <a:lstStyle/>
+          <a:p>
+            <a:r>
+              <a:rPr lang="en-US" dirty="0" smtClean="0"/>
+              <a:t>Redirect to an m-dot</a:t>
+            </a:r>
+          </a:p>
+          <a:p>
+            <a:pPr lvl="1"/>
+            <a:r>
+              <a:rPr lang="en-US" dirty="0" smtClean="0"/>
+              <a:t>Not good for SEO</a:t>
+            </a:r>
+          </a:p>
+          <a:p>
+            <a:pPr lvl="1"/>
+            <a:r>
+              <a:rPr lang="en-US" dirty="0" smtClean="0"/>
+              <a:t>Takes time</a:t>
+            </a:r>
+          </a:p>
+          <a:p>
+            <a:pPr lvl="1"/>
+            <a:r>
+              <a:rPr lang="en-US" dirty="0" smtClean="0"/>
+              <a:t>Bad links when users share content</a:t>
+            </a:r>
+          </a:p>
+          <a:p>
+            <a:r>
+              <a:rPr lang="en-US" dirty="0" smtClean="0"/>
+              <a:t>Message size</a:t>
+            </a:r>
+          </a:p>
+          <a:p>
+            <a:pPr lvl="1"/>
+            <a:r>
+              <a:rPr lang="en-US" dirty="0" smtClean="0"/>
+              <a:t>Choose JSON</a:t>
+            </a:r>
+          </a:p>
+          <a:p>
+            <a:pPr lvl="1"/>
+            <a:r>
+              <a:rPr lang="en-US" dirty="0" smtClean="0"/>
+              <a:t>Consider OData</a:t>
+            </a:r>
+            <a:endParaRPr lang="en-US" dirty="0"/>
+          </a:p>
+        </p:txBody>
+      </p:sp>
+    </p:spTree>
+    <p:extLst>
+      <p:ext uri="{BB962C8B-B14F-4D97-AF65-F5344CB8AC3E}">
+        <p14:creationId xmlns:p14="http://schemas.microsoft.com/office/powerpoint/2010/main" val="810613002"/>
+      </p:ext>
+    </p:extLst>
+  </p:cSld>
+  <p:clrMapOvr>
+    <a:masterClrMapping/>
+  </p:clrMapOvr>
+</p:sld>
+</file>
+
+<file path=ppt/slides/slide12.xml><?xml version="1.0" encoding="utf-8"?>
+<p:sld xmlns:a="http://schemas.openxmlformats.org/drawingml/2006/main" xmlns:r="http://schemas.openxmlformats.org/officeDocument/2006/relationships" xmlns:p="http://schemas.openxmlformats.org/presentationml/2006/main">
+  <p:cSld>
+    <p:spTree>
+      <p:nvGrpSpPr>
+        <p:cNvPr id="1" name=""/>
+        <p:cNvGrpSpPr/>
+        <p:nvPr/>
+      </p:nvGrpSpPr>
+      <p:grpSpPr>
+        <a:xfrm>
+          <a:off x="0" y="0"/>
+          <a:ext cx="0" cy="0"/>
+          <a:chOff x="0" y="0"/>
+          <a:chExt cx="0" cy="0"/>
+        </a:xfrm>
+      </p:grpSpPr>
+      <p:sp>
+        <p:nvSpPr>
+          <p:cNvPr id="2" name="Title 1"/>
+          <p:cNvSpPr>
+            <a:spLocks noGrp="1"/>
+          </p:cNvSpPr>
+          <p:nvPr>
+            <p:ph type="title"/>
+          </p:nvPr>
+        </p:nvSpPr>
+        <p:spPr/>
+        <p:txBody>
+          <a:bodyPr/>
+          <a:lstStyle/>
+          <a:p>
+            <a:r>
+              <a:rPr lang="en-US" dirty="0" smtClean="0"/>
+              <a:t>Benefits of JSON and OData</a:t>
+            </a:r>
+            <a:endParaRPr lang="en-US" dirty="0"/>
+          </a:p>
+        </p:txBody>
+      </p:sp>
+    </p:spTree>
+    <p:extLst>
+      <p:ext uri="{BB962C8B-B14F-4D97-AF65-F5344CB8AC3E}">
+        <p14:creationId xmlns:p14="http://schemas.microsoft.com/office/powerpoint/2010/main" val="3028931860"/>
+      </p:ext>
+    </p:extLst>
+  </p:cSld>
+  <p:clrMapOvr>
+    <a:masterClrMapping/>
+  </p:clrMapOvr>
+</p:sld>
+</file>
+
+<file path=ppt/slides/slide13.xml><?xml version="1.0" encoding="utf-8"?>
+<p:sld xmlns:a="http://schemas.openxmlformats.org/drawingml/2006/main" xmlns:r="http://schemas.openxmlformats.org/officeDocument/2006/relationships" xmlns:p="http://schemas.openxmlformats.org/presentationml/2006/main">
+  <p:cSld>
+    <p:spTree>
+      <p:nvGrpSpPr>
+        <p:cNvPr id="1" name=""/>
+        <p:cNvGrpSpPr/>
+        <p:nvPr/>
+      </p:nvGrpSpPr>
+      <p:grpSpPr>
+        <a:xfrm>
+          <a:off x="0" y="0"/>
+          <a:ext cx="0" cy="0"/>
+          <a:chOff x="0" y="0"/>
+          <a:chExt cx="0" cy="0"/>
+        </a:xfrm>
+      </p:grpSpPr>
+      <p:sp>
+        <p:nvSpPr>
           <p:cNvPr id="7" name="Content Placeholder 6"/>
           <p:cNvSpPr>
             <a:spLocks noGrp="1"/>
@@ -6861,18 +7235,24 @@
           <a:lstStyle/>
           <a:p>
             <a:r>
-              <a:rPr lang="en-GB" dirty="0" smtClean="0">
-                <a:solidFill>
-                  <a:srgbClr val="FF0000"/>
-                </a:solidFill>
-              </a:rPr>
-              <a:t>{azure mobile services docs}</a:t>
-            </a:r>
-            <a:endParaRPr lang="en-GB" dirty="0">
-              <a:solidFill>
-                <a:srgbClr val="FF0000"/>
-              </a:solidFill>
-            </a:endParaRPr>
+              <a:rPr lang="en-GB" dirty="0" smtClean="0"/>
+              <a:t>azure.microsoft.com/</a:t>
+            </a:r>
+            <a:r>
+              <a:rPr lang="en-GB" dirty="0" err="1" smtClean="0"/>
+              <a:t>en</a:t>
+            </a:r>
+            <a:r>
+              <a:rPr lang="en-GB" dirty="0" smtClean="0"/>
+              <a:t>-us/develop/mobile/reference</a:t>
+            </a:r>
+          </a:p>
+          <a:p>
+            <a:r>
+              <a:rPr lang="en-GB" dirty="0" smtClean="0"/>
+              <a:t>odata.org</a:t>
+            </a:r>
+            <a:endParaRPr lang="en-GB" dirty="0"/>
           </a:p>
         </p:txBody>
       </p:sp>
@@ -6919,7 +7299,7 @@
 </p:sld>
 </file>
 
-<file path=ppt/slides/slide11.xml><?xml version="1.0" encoding="utf-8"?>
+<file path=ppt/slides/slide14.xml><?xml version="1.0" encoding="utf-8"?>
 <p:sld xmlns:a="http://schemas.openxmlformats.org/drawingml/2006/main" xmlns:r="http://schemas.openxmlformats.org/officeDocument/2006/relationships" xmlns:p="http://schemas.openxmlformats.org/presentationml/2006/main">
   <p:cSld>
     <p:spTree>
@@ -6962,7 +7342,17 @@
           <a:p>
             <a:r>
               <a:rPr lang="en-GB" dirty="0" smtClean="0"/>
-              <a:t>Creating the Mobile Service</a:t>
+              <a:t>Creating the Mobile </a:t>
+            </a:r>
+            <a:r>
+              <a:rPr lang="en-GB" dirty="0" smtClean="0"/>
+              <a:t>Service</a:t>
+            </a:r>
+          </a:p>
+          <a:p>
+            <a:r>
+              <a:rPr lang="en-GB" dirty="0" smtClean="0"/>
+              <a:t>Considerations for mobile sites</a:t>
             </a:r>
             <a:endParaRPr lang="en-GB" dirty="0"/>
           </a:p>
@@ -7014,7 +7404,7 @@
 </p:sld>
 </file>
 
-<file path=ppt/slides/slide12.xml><?xml version="1.0" encoding="utf-8"?>
+<file path=ppt/slides/slide15.xml><?xml version="1.0" encoding="utf-8"?>
 <p:sld xmlns:a="http://schemas.openxmlformats.org/drawingml/2006/main" xmlns:r="http://schemas.openxmlformats.org/officeDocument/2006/relationships" xmlns:p="http://schemas.openxmlformats.org/presentationml/2006/main">
   <p:cSld>
     <p:spTree>
@@ -7116,14 +7506,14 @@
                 <a:gridCol w="5762625">
                   <a:extLst>
                     <a:ext uri="{9D8B030D-6E8A-4147-A177-3AD203B41FA5}">
-                      <a16:colId xmlns="" xmlns:a16="http://schemas.microsoft.com/office/drawing/2014/main" val="1632794655"/>
+                      <a16:colId xmlns:a16="http://schemas.microsoft.com/office/drawing/2014/main" xmlns="" val="1632794655"/>
                     </a:ext>
                   </a:extLst>
                 </a:gridCol>
                 <a:gridCol w="5762625">
                   <a:extLst>
                     <a:ext uri="{9D8B030D-6E8A-4147-A177-3AD203B41FA5}">
-                      <a16:colId xmlns="" xmlns:a16="http://schemas.microsoft.com/office/drawing/2014/main" val="2011313899"/>
+                      <a16:colId xmlns:a16="http://schemas.microsoft.com/office/drawing/2014/main" xmlns="" val="2011313899"/>
                     </a:ext>
                   </a:extLst>
                 </a:gridCol>
@@ -7161,7 +7551,7 @@
                 </a:tc>
                 <a:extLst>
                   <a:ext uri="{0D108BD9-81ED-4DB2-BD59-A6C34878D82A}">
-                    <a16:rowId xmlns="" xmlns:a16="http://schemas.microsoft.com/office/drawing/2014/main" val="1789177411"/>
+                    <a16:rowId xmlns:a16="http://schemas.microsoft.com/office/drawing/2014/main" xmlns="" val="1789177411"/>
                   </a:ext>
                 </a:extLst>
               </a:tr>
@@ -7222,7 +7612,7 @@
                 </a:tc>
                 <a:extLst>
                   <a:ext uri="{0D108BD9-81ED-4DB2-BD59-A6C34878D82A}">
-                    <a16:rowId xmlns="" xmlns:a16="http://schemas.microsoft.com/office/drawing/2014/main" val="3842815335"/>
+                    <a16:rowId xmlns:a16="http://schemas.microsoft.com/office/drawing/2014/main" xmlns="" val="3842815335"/>
                   </a:ext>
                 </a:extLst>
               </a:tr>
@@ -7269,7 +7659,7 @@
                 </a:tc>
                 <a:extLst>
                   <a:ext uri="{0D108BD9-81ED-4DB2-BD59-A6C34878D82A}">
-                    <a16:rowId xmlns="" xmlns:a16="http://schemas.microsoft.com/office/drawing/2014/main" val="321066646"/>
+                    <a16:rowId xmlns:a16="http://schemas.microsoft.com/office/drawing/2014/main" xmlns="" val="321066646"/>
                   </a:ext>
                 </a:extLst>
               </a:tr>
@@ -7340,7 +7730,7 @@
                 </a:tc>
                 <a:extLst>
                   <a:ext uri="{0D108BD9-81ED-4DB2-BD59-A6C34878D82A}">
-                    <a16:rowId xmlns="" xmlns:a16="http://schemas.microsoft.com/office/drawing/2014/main" val="3812060533"/>
+                    <a16:rowId xmlns:a16="http://schemas.microsoft.com/office/drawing/2014/main" xmlns="" val="3812060533"/>
                   </a:ext>
                 </a:extLst>
               </a:tr>
@@ -7591,7 +7981,17 @@
           <a:p>
             <a:r>
               <a:rPr lang="en-GB" dirty="0" smtClean="0"/>
-              <a:t>Creating the Mobile Service</a:t>
+              <a:t>Creating the Mobile </a:t>
+            </a:r>
+            <a:r>
+              <a:rPr lang="en-GB" dirty="0" smtClean="0"/>
+              <a:t>Service</a:t>
+            </a:r>
+          </a:p>
+          <a:p>
+            <a:r>
+              <a:rPr lang="en-GB" dirty="0" smtClean="0"/>
+              <a:t>Considerations for mobile sites</a:t>
             </a:r>
             <a:endParaRPr lang="en-GB" dirty="0"/>
           </a:p>
@@ -9499,12 +9899,6 @@
 </file>
 
 <file path=customXml/item1.xml><?xml version="1.0" encoding="utf-8"?>
-<p:properties xmlns:p="http://schemas.microsoft.com/office/2006/metadata/properties" xmlns:xsi="http://www.w3.org/2001/XMLSchema-instance" xmlns:pc="http://schemas.microsoft.com/office/infopath/2007/PartnerControls">
-  <documentManagement/>
-</p:properties>
-</file>
-
-<file path=customXml/item2.xml><?xml version="1.0" encoding="utf-8"?>
 <ct:contentTypeSchema xmlns:ct="http://schemas.microsoft.com/office/2006/metadata/contentType" xmlns:ma="http://schemas.microsoft.com/office/2006/metadata/properties/metaAttributes" ct:_="" ma:_="" ma:contentTypeName="Document" ma:contentTypeID="0x010100CF3CFFA86DA93345A891C3CCBC738F63" ma:contentTypeVersion="1" ma:contentTypeDescription="Create a new document." ma:contentTypeScope="" ma:versionID="060e45d69093970729cdde03e78aa3cc">
   <xsd:schema xmlns:xsd="http://www.w3.org/2001/XMLSchema" xmlns:xs="http://www.w3.org/2001/XMLSchema" xmlns:p="http://schemas.microsoft.com/office/2006/metadata/properties" xmlns:ns3="ecd1fa32-ae44-48d6-80a1-71a52da60b4a" targetNamespace="http://schemas.microsoft.com/office/2006/metadata/properties" ma:root="true" ma:fieldsID="2fc9741b54117334ed0e10932dac3600" ns3:_="">
     <xsd:import namespace="ecd1fa32-ae44-48d6-80a1-71a52da60b4a"/>
@@ -9644,6 +10038,12 @@
 </ct:contentTypeSchema>
 </file>
 
+<file path=customXml/item2.xml><?xml version="1.0" encoding="utf-8"?>
+<p:properties xmlns:p="http://schemas.microsoft.com/office/2006/metadata/properties" xmlns:xsi="http://www.w3.org/2001/XMLSchema-instance" xmlns:pc="http://schemas.microsoft.com/office/infopath/2007/PartnerControls">
+  <documentManagement/>
+</p:properties>
+</file>
+
 <file path=customXml/item3.xml><?xml version="1.0" encoding="utf-8"?>
 <?mso-contentType ?>
 <FormTemplates xmlns="http://schemas.microsoft.com/sharepoint/v3/contenttype/forms">
@@ -9654,22 +10054,6 @@
 </file>
 
 <file path=customXml/itemProps1.xml><?xml version="1.0" encoding="utf-8"?>
-<ds:datastoreItem xmlns:ds="http://schemas.openxmlformats.org/officeDocument/2006/customXml" ds:itemID="{7025FDD9-4C58-4084-9F89-0E6ADD6FFF55}">
-  <ds:schemaRefs>
-    <ds:schemaRef ds:uri="http://schemas.microsoft.com/office/2006/metadata/properties"/>
-    <ds:schemaRef ds:uri="http://purl.org/dc/terms/"/>
-    <ds:schemaRef ds:uri="http://schemas.openxmlformats.org/package/2006/metadata/core-properties"/>
-    <ds:schemaRef ds:uri="http://schemas.microsoft.com/office/2006/documentManagement/types"/>
-    <ds:schemaRef ds:uri="http://purl.org/dc/dcmitype/"/>
-    <ds:schemaRef ds:uri="http://schemas.microsoft.com/office/infopath/2007/PartnerControls"/>
-    <ds:schemaRef ds:uri="ecd1fa32-ae44-48d6-80a1-71a52da60b4a"/>
-    <ds:schemaRef ds:uri="http://purl.org/dc/elements/1.1/"/>
-    <ds:schemaRef ds:uri="http://www.w3.org/XML/1998/namespace"/>
-  </ds:schemaRefs>
-</ds:datastoreItem>
-</file>
-
-<file path=customXml/itemProps2.xml><?xml version="1.0" encoding="utf-8"?>
 <ds:datastoreItem xmlns:ds="http://schemas.openxmlformats.org/officeDocument/2006/customXml" ds:itemID="{A545FFDC-6555-4FAD-8A13-72F96FEB882E}">
   <ds:schemaRefs>
     <ds:schemaRef ds:uri="http://schemas.microsoft.com/office/2006/metadata/contentType"/>
@@ -9687,6 +10071,22 @@
 </ds:datastoreItem>
 </file>
 
+<file path=customXml/itemProps2.xml><?xml version="1.0" encoding="utf-8"?>
+<ds:datastoreItem xmlns:ds="http://schemas.openxmlformats.org/officeDocument/2006/customXml" ds:itemID="{7025FDD9-4C58-4084-9F89-0E6ADD6FFF55}">
+  <ds:schemaRefs>
+    <ds:schemaRef ds:uri="http://schemas.microsoft.com/office/2006/metadata/properties"/>
+    <ds:schemaRef ds:uri="http://purl.org/dc/terms/"/>
+    <ds:schemaRef ds:uri="http://schemas.openxmlformats.org/package/2006/metadata/core-properties"/>
+    <ds:schemaRef ds:uri="http://schemas.microsoft.com/office/2006/documentManagement/types"/>
+    <ds:schemaRef ds:uri="http://purl.org/dc/dcmitype/"/>
+    <ds:schemaRef ds:uri="http://schemas.microsoft.com/office/infopath/2007/PartnerControls"/>
+    <ds:schemaRef ds:uri="ecd1fa32-ae44-48d6-80a1-71a52da60b4a"/>
+    <ds:schemaRef ds:uri="http://purl.org/dc/elements/1.1/"/>
+    <ds:schemaRef ds:uri="http://www.w3.org/XML/1998/namespace"/>
+  </ds:schemaRefs>
+</ds:datastoreItem>
+</file>
+
 <file path=customXml/itemProps3.xml><?xml version="1.0" encoding="utf-8"?>
 <ds:datastoreItem xmlns:ds="http://schemas.openxmlformats.org/officeDocument/2006/customXml" ds:itemID="{B0CA13EC-1D3C-4D6F-8D1C-E8A452CFC79A}">
   <ds:schemaRefs>

</xml_diff>

<commit_message>
remove left sidebar, work toward getting hammer swipe working (not quite there)
</commit_message>
<xml_diff>
--- a/Slides/M4 Server.pptx
+++ b/Slides/M4 Server.pptx
@@ -6863,11 +6863,7 @@
           <a:p>
             <a:r>
               <a:rPr lang="en-GB" dirty="0" smtClean="0"/>
-              <a:t>Creating the Mobile </a:t>
-            </a:r>
-            <a:r>
-              <a:rPr lang="en-GB" dirty="0" smtClean="0"/>
-              <a:t>Service</a:t>
+              <a:t>Creating the Mobile Service</a:t>
             </a:r>
             <a:endParaRPr lang="en-GB" dirty="0"/>
           </a:p>
@@ -7018,14 +7014,14 @@
                 <a:gridCol w="5762625">
                   <a:extLst>
                     <a:ext uri="{9D8B030D-6E8A-4147-A177-3AD203B41FA5}">
-                      <a16:colId xmlns="" xmlns:a16="http://schemas.microsoft.com/office/drawing/2014/main" val="1632794655"/>
+                      <a16:colId xmlns:a16="http://schemas.microsoft.com/office/drawing/2014/main" xmlns="" val="1632794655"/>
                     </a:ext>
                   </a:extLst>
                 </a:gridCol>
                 <a:gridCol w="5762625">
                   <a:extLst>
                     <a:ext uri="{9D8B030D-6E8A-4147-A177-3AD203B41FA5}">
-                      <a16:colId xmlns="" xmlns:a16="http://schemas.microsoft.com/office/drawing/2014/main" val="2011313899"/>
+                      <a16:colId xmlns:a16="http://schemas.microsoft.com/office/drawing/2014/main" xmlns="" val="2011313899"/>
                     </a:ext>
                   </a:extLst>
                 </a:gridCol>
@@ -7063,7 +7059,7 @@
                 </a:tc>
                 <a:extLst>
                   <a:ext uri="{0D108BD9-81ED-4DB2-BD59-A6C34878D82A}">
-                    <a16:rowId xmlns="" xmlns:a16="http://schemas.microsoft.com/office/drawing/2014/main" val="1789177411"/>
+                    <a16:rowId xmlns:a16="http://schemas.microsoft.com/office/drawing/2014/main" xmlns="" val="1789177411"/>
                   </a:ext>
                 </a:extLst>
               </a:tr>
@@ -7124,7 +7120,7 @@
                 </a:tc>
                 <a:extLst>
                   <a:ext uri="{0D108BD9-81ED-4DB2-BD59-A6C34878D82A}">
-                    <a16:rowId xmlns="" xmlns:a16="http://schemas.microsoft.com/office/drawing/2014/main" val="3842815335"/>
+                    <a16:rowId xmlns:a16="http://schemas.microsoft.com/office/drawing/2014/main" xmlns="" val="3842815335"/>
                   </a:ext>
                 </a:extLst>
               </a:tr>
@@ -7171,7 +7167,7 @@
                 </a:tc>
                 <a:extLst>
                   <a:ext uri="{0D108BD9-81ED-4DB2-BD59-A6C34878D82A}">
-                    <a16:rowId xmlns="" xmlns:a16="http://schemas.microsoft.com/office/drawing/2014/main" val="321066646"/>
+                    <a16:rowId xmlns:a16="http://schemas.microsoft.com/office/drawing/2014/main" xmlns="" val="321066646"/>
                   </a:ext>
                 </a:extLst>
               </a:tr>
@@ -7242,7 +7238,7 @@
                 </a:tc>
                 <a:extLst>
                   <a:ext uri="{0D108BD9-81ED-4DB2-BD59-A6C34878D82A}">
-                    <a16:rowId xmlns="" xmlns:a16="http://schemas.microsoft.com/office/drawing/2014/main" val="3812060533"/>
+                    <a16:rowId xmlns:a16="http://schemas.microsoft.com/office/drawing/2014/main" xmlns="" val="3812060533"/>
                   </a:ext>
                 </a:extLst>
               </a:tr>
@@ -9410,21 +9406,6 @@
 </file>
 
 <file path=customXml/item1.xml><?xml version="1.0" encoding="utf-8"?>
-<?mso-contentType ?>
-<FormTemplates xmlns="http://schemas.microsoft.com/sharepoint/v3/contenttype/forms">
-  <Display>DocumentLibraryForm</Display>
-  <Edit>DocumentLibraryForm</Edit>
-  <New>DocumentLibraryForm</New>
-</FormTemplates>
-</file>
-
-<file path=customXml/item2.xml><?xml version="1.0" encoding="utf-8"?>
-<p:properties xmlns:p="http://schemas.microsoft.com/office/2006/metadata/properties" xmlns:xsi="http://www.w3.org/2001/XMLSchema-instance" xmlns:pc="http://schemas.microsoft.com/office/infopath/2007/PartnerControls">
-  <documentManagement/>
-</p:properties>
-</file>
-
-<file path=customXml/item3.xml><?xml version="1.0" encoding="utf-8"?>
 <ct:contentTypeSchema xmlns:ct="http://schemas.microsoft.com/office/2006/metadata/contentType" xmlns:ma="http://schemas.microsoft.com/office/2006/metadata/properties/metaAttributes" ct:_="" ma:_="" ma:contentTypeName="Document" ma:contentTypeID="0x010100CF3CFFA86DA93345A891C3CCBC738F63" ma:contentTypeVersion="1" ma:contentTypeDescription="Create a new document." ma:contentTypeScope="" ma:versionID="060e45d69093970729cdde03e78aa3cc">
   <xsd:schema xmlns:xsd="http://www.w3.org/2001/XMLSchema" xmlns:xs="http://www.w3.org/2001/XMLSchema" xmlns:p="http://schemas.microsoft.com/office/2006/metadata/properties" xmlns:ns3="ecd1fa32-ae44-48d6-80a1-71a52da60b4a" targetNamespace="http://schemas.microsoft.com/office/2006/metadata/properties" ma:root="true" ma:fieldsID="2fc9741b54117334ed0e10932dac3600" ns3:_="">
     <xsd:import namespace="ecd1fa32-ae44-48d6-80a1-71a52da60b4a"/>
@@ -9564,31 +9545,22 @@
 </ct:contentTypeSchema>
 </file>
 
-<file path=customXml/itemProps1.xml><?xml version="1.0" encoding="utf-8"?>
-<ds:datastoreItem xmlns:ds="http://schemas.openxmlformats.org/officeDocument/2006/customXml" ds:itemID="{B0CA13EC-1D3C-4D6F-8D1C-E8A452CFC79A}">
-  <ds:schemaRefs>
-    <ds:schemaRef ds:uri="http://schemas.microsoft.com/sharepoint/v3/contenttype/forms"/>
-  </ds:schemaRefs>
-</ds:datastoreItem>
+<file path=customXml/item2.xml><?xml version="1.0" encoding="utf-8"?>
+<p:properties xmlns:p="http://schemas.microsoft.com/office/2006/metadata/properties" xmlns:xsi="http://www.w3.org/2001/XMLSchema-instance" xmlns:pc="http://schemas.microsoft.com/office/infopath/2007/PartnerControls">
+  <documentManagement/>
+</p:properties>
 </file>
 
-<file path=customXml/itemProps2.xml><?xml version="1.0" encoding="utf-8"?>
-<ds:datastoreItem xmlns:ds="http://schemas.openxmlformats.org/officeDocument/2006/customXml" ds:itemID="{7025FDD9-4C58-4084-9F89-0E6ADD6FFF55}">
-  <ds:schemaRefs>
-    <ds:schemaRef ds:uri="http://purl.org/dc/terms/"/>
-    <ds:schemaRef ds:uri="http://schemas.microsoft.com/office/2006/documentManagement/types"/>
-    <ds:schemaRef ds:uri="http://schemas.microsoft.com/office/infopath/2007/PartnerControls"/>
-    <ds:schemaRef ds:uri="ecd1fa32-ae44-48d6-80a1-71a52da60b4a"/>
-    <ds:schemaRef ds:uri="http://schemas.openxmlformats.org/package/2006/metadata/core-properties"/>
-    <ds:schemaRef ds:uri="http://purl.org/dc/elements/1.1/"/>
-    <ds:schemaRef ds:uri="http://schemas.microsoft.com/office/2006/metadata/properties"/>
-    <ds:schemaRef ds:uri="http://www.w3.org/XML/1998/namespace"/>
-    <ds:schemaRef ds:uri="http://purl.org/dc/dcmitype/"/>
-  </ds:schemaRefs>
-</ds:datastoreItem>
+<file path=customXml/item3.xml><?xml version="1.0" encoding="utf-8"?>
+<?mso-contentType ?>
+<FormTemplates xmlns="http://schemas.microsoft.com/sharepoint/v3/contenttype/forms">
+  <Display>DocumentLibraryForm</Display>
+  <Edit>DocumentLibraryForm</Edit>
+  <New>DocumentLibraryForm</New>
+</FormTemplates>
 </file>
 
-<file path=customXml/itemProps3.xml><?xml version="1.0" encoding="utf-8"?>
+<file path=customXml/itemProps1.xml><?xml version="1.0" encoding="utf-8"?>
 <ds:datastoreItem xmlns:ds="http://schemas.openxmlformats.org/officeDocument/2006/customXml" ds:itemID="{A545FFDC-6555-4FAD-8A13-72F96FEB882E}">
   <ds:schemaRefs>
     <ds:schemaRef ds:uri="http://schemas.microsoft.com/office/2006/metadata/contentType"/>
@@ -9604,4 +9576,28 @@
     <ds:schemaRef ds:uri="http://schemas.microsoft.com/internal/obd"/>
   </ds:schemaRefs>
 </ds:datastoreItem>
+</file>
+
+<file path=customXml/itemProps2.xml><?xml version="1.0" encoding="utf-8"?>
+<ds:datastoreItem xmlns:ds="http://schemas.openxmlformats.org/officeDocument/2006/customXml" ds:itemID="{7025FDD9-4C58-4084-9F89-0E6ADD6FFF55}">
+  <ds:schemaRefs>
+    <ds:schemaRef ds:uri="http://purl.org/dc/terms/"/>
+    <ds:schemaRef ds:uri="ecd1fa32-ae44-48d6-80a1-71a52da60b4a"/>
+    <ds:schemaRef ds:uri="http://schemas.microsoft.com/office/2006/documentManagement/types"/>
+    <ds:schemaRef ds:uri="http://schemas.microsoft.com/office/2006/metadata/properties"/>
+    <ds:schemaRef ds:uri="http://purl.org/dc/elements/1.1/"/>
+    <ds:schemaRef ds:uri="http://schemas.openxmlformats.org/package/2006/metadata/core-properties"/>
+    <ds:schemaRef ds:uri="http://schemas.microsoft.com/office/infopath/2007/PartnerControls"/>
+    <ds:schemaRef ds:uri="http://www.w3.org/XML/1998/namespace"/>
+    <ds:schemaRef ds:uri="http://purl.org/dc/dcmitype/"/>
+  </ds:schemaRefs>
+</ds:datastoreItem>
+</file>
+
+<file path=customXml/itemProps3.xml><?xml version="1.0" encoding="utf-8"?>
+<ds:datastoreItem xmlns:ds="http://schemas.openxmlformats.org/officeDocument/2006/customXml" ds:itemID="{B0CA13EC-1D3C-4D6F-8D1C-E8A452CFC79A}">
+  <ds:schemaRefs>
+    <ds:schemaRef ds:uri="http://schemas.microsoft.com/sharepoint/v3/contenttype/forms"/>
+  </ds:schemaRefs>
+</ds:datastoreItem>
 </file>
</xml_diff>